<commit_message>
Saving models and results feature
</commit_message>
<xml_diff>
--- a/Presentation.pptx
+++ b/Presentation.pptx
@@ -4486,32 +4486,10 @@
           <a:lstStyle/>
           <a:p>
             <a:r>
-              <a:rPr lang="en-US" sz="4000" b="1"/>
-              <a:t>Ch</a:t>
-            </a:r>
-            <a:r>
-              <a:rPr lang="vi-VN" sz="4000" b="1"/>
-              <a:t>ư</a:t>
-            </a:r>
-            <a:r>
-              <a:rPr lang="en-US" sz="4000" b="1"/>
-              <a:t>ơng 03</a:t>
-            </a:r>
-            <a:br>
-              <a:rPr lang="en-US" sz="4000" b="1"/>
-            </a:br>
-            <a:r>
-              <a:rPr lang="en-US" sz="4000"/>
-              <a:t>GIỚI THIỆU </a:t>
-            </a:r>
-            <a:br>
-              <a:rPr lang="en-US" sz="4000"/>
-            </a:br>
-            <a:r>
-              <a:rPr lang="en-US" sz="4000"/>
-              <a:t>FEATURE ENGINEERING</a:t>
-            </a:r>
-            <a:endParaRPr lang="en-US" sz="4000" b="1"/>
+              <a:rPr lang="en-US" sz="4000" dirty="0"/>
+              <a:t>HANDWRITTEN DIGIT IDENTIFICATION</a:t>
+            </a:r>
+            <a:endParaRPr lang="en-US" sz="4000" b="1" dirty="0"/>
           </a:p>
         </p:txBody>
       </p:sp>
@@ -6590,7 +6568,7 @@
           <a:lstStyle/>
           <a:p>
             <a:r>
-              <a:rPr lang="en-US"/>
+              <a:rPr lang="en-US" dirty="0"/>
               <a:t>Handwritten digit identification</a:t>
             </a:r>
           </a:p>

</xml_diff>